<commit_message>
death, come release me
</commit_message>
<xml_diff>
--- a/Semester II/Masterproef/presentatie/masterproef.pptx
+++ b/Semester II/Masterproef/presentatie/masterproef.pptx
@@ -201,7 +201,7 @@
           <a:p>
             <a:fld id="{9680C15C-8183-49BA-AFE4-46F597A70BBD}" type="datetimeFigureOut">
               <a:rPr lang="en-US" smtClean="0"/>
-              <a:t>7/4/2019</a:t>
+              <a:t>7/5/2019</a:t>
             </a:fld>
             <a:endParaRPr lang="en-US"/>
           </a:p>
@@ -699,7 +699,7 @@
           <a:p>
             <a:fld id="{3C1FBD69-EDDB-4129-B5D9-AB83034965BC}" type="datetimeFigureOut">
               <a:rPr lang="en-US" smtClean="0"/>
-              <a:t>7/4/2019</a:t>
+              <a:t>7/5/2019</a:t>
             </a:fld>
             <a:endParaRPr lang="en-US"/>
           </a:p>
@@ -897,7 +897,7 @@
           <a:p>
             <a:fld id="{3C1FBD69-EDDB-4129-B5D9-AB83034965BC}" type="datetimeFigureOut">
               <a:rPr lang="en-US" smtClean="0"/>
-              <a:t>7/4/2019</a:t>
+              <a:t>7/5/2019</a:t>
             </a:fld>
             <a:endParaRPr lang="en-US"/>
           </a:p>
@@ -1105,7 +1105,7 @@
           <a:p>
             <a:fld id="{3C1FBD69-EDDB-4129-B5D9-AB83034965BC}" type="datetimeFigureOut">
               <a:rPr lang="en-US" smtClean="0"/>
-              <a:t>7/4/2019</a:t>
+              <a:t>7/5/2019</a:t>
             </a:fld>
             <a:endParaRPr lang="en-US"/>
           </a:p>
@@ -1303,7 +1303,7 @@
           <a:p>
             <a:fld id="{3C1FBD69-EDDB-4129-B5D9-AB83034965BC}" type="datetimeFigureOut">
               <a:rPr lang="en-US" smtClean="0"/>
-              <a:t>7/4/2019</a:t>
+              <a:t>7/5/2019</a:t>
             </a:fld>
             <a:endParaRPr lang="en-US"/>
           </a:p>
@@ -1578,7 +1578,7 @@
           <a:p>
             <a:fld id="{3C1FBD69-EDDB-4129-B5D9-AB83034965BC}" type="datetimeFigureOut">
               <a:rPr lang="en-US" smtClean="0"/>
-              <a:t>7/4/2019</a:t>
+              <a:t>7/5/2019</a:t>
             </a:fld>
             <a:endParaRPr lang="en-US"/>
           </a:p>
@@ -1843,7 +1843,7 @@
           <a:p>
             <a:fld id="{3C1FBD69-EDDB-4129-B5D9-AB83034965BC}" type="datetimeFigureOut">
               <a:rPr lang="en-US" smtClean="0"/>
-              <a:t>7/4/2019</a:t>
+              <a:t>7/5/2019</a:t>
             </a:fld>
             <a:endParaRPr lang="en-US"/>
           </a:p>
@@ -2255,7 +2255,7 @@
           <a:p>
             <a:fld id="{3C1FBD69-EDDB-4129-B5D9-AB83034965BC}" type="datetimeFigureOut">
               <a:rPr lang="en-US" smtClean="0"/>
-              <a:t>7/4/2019</a:t>
+              <a:t>7/5/2019</a:t>
             </a:fld>
             <a:endParaRPr lang="en-US"/>
           </a:p>
@@ -2396,7 +2396,7 @@
           <a:p>
             <a:fld id="{3C1FBD69-EDDB-4129-B5D9-AB83034965BC}" type="datetimeFigureOut">
               <a:rPr lang="en-US" smtClean="0"/>
-              <a:t>7/4/2019</a:t>
+              <a:t>7/5/2019</a:t>
             </a:fld>
             <a:endParaRPr lang="en-US"/>
           </a:p>
@@ -2509,7 +2509,7 @@
           <a:p>
             <a:fld id="{3C1FBD69-EDDB-4129-B5D9-AB83034965BC}" type="datetimeFigureOut">
               <a:rPr lang="en-US" smtClean="0"/>
-              <a:t>7/4/2019</a:t>
+              <a:t>7/5/2019</a:t>
             </a:fld>
             <a:endParaRPr lang="en-US"/>
           </a:p>
@@ -2820,7 +2820,7 @@
           <a:p>
             <a:fld id="{3C1FBD69-EDDB-4129-B5D9-AB83034965BC}" type="datetimeFigureOut">
               <a:rPr lang="en-US" smtClean="0"/>
-              <a:t>7/4/2019</a:t>
+              <a:t>7/5/2019</a:t>
             </a:fld>
             <a:endParaRPr lang="en-US"/>
           </a:p>
@@ -3108,7 +3108,7 @@
           <a:p>
             <a:fld id="{3C1FBD69-EDDB-4129-B5D9-AB83034965BC}" type="datetimeFigureOut">
               <a:rPr lang="en-US" smtClean="0"/>
-              <a:t>7/4/2019</a:t>
+              <a:t>7/5/2019</a:t>
             </a:fld>
             <a:endParaRPr lang="en-US"/>
           </a:p>
@@ -3349,7 +3349,7 @@
           <a:p>
             <a:fld id="{3C1FBD69-EDDB-4129-B5D9-AB83034965BC}" type="datetimeFigureOut">
               <a:rPr lang="en-US" smtClean="0"/>
-              <a:t>7/4/2019</a:t>
+              <a:t>7/5/2019</a:t>
             </a:fld>
             <a:endParaRPr lang="en-US"/>
           </a:p>
@@ -4440,17 +4440,19 @@
       </p:sp>
       <p:pic>
         <p:nvPicPr>
-          <p:cNvPr id="9" name="Picture 8">
-            <a:extLst>
-              <a:ext uri="{FF2B5EF4-FFF2-40B4-BE49-F238E27FC236}">
-                <a16:creationId xmlns:a16="http://schemas.microsoft.com/office/drawing/2014/main" id="{22FDD6FD-BF34-4665-A830-5EB2CAF2A7EB}"/>
+          <p:cNvPr id="6" name="Content Placeholder 5">
+            <a:extLst>
+              <a:ext uri="{FF2B5EF4-FFF2-40B4-BE49-F238E27FC236}">
+                <a16:creationId xmlns:a16="http://schemas.microsoft.com/office/drawing/2014/main" id="{5EB14236-C8E5-4B6A-89C5-8E8EB950B750}"/>
               </a:ext>
             </a:extLst>
           </p:cNvPr>
           <p:cNvPicPr>
-            <a:picLocks noChangeAspect="1"/>
+            <a:picLocks noGrp="1" noChangeAspect="1"/>
           </p:cNvPicPr>
-          <p:nvPr/>
+          <p:nvPr>
+            <p:ph idx="1"/>
+          </p:nvPr>
         </p:nvPicPr>
         <p:blipFill>
           <a:blip r:embed="rId2">
@@ -4466,8 +4468,41 @@
         </p:blipFill>
         <p:spPr>
           <a:xfrm>
-            <a:off x="7086586" y="0"/>
-            <a:ext cx="5105414" cy="4011086"/>
+            <a:off x="0" y="0"/>
+            <a:ext cx="4138628" cy="3103972"/>
+          </a:xfrm>
+        </p:spPr>
+      </p:pic>
+      <p:pic>
+        <p:nvPicPr>
+          <p:cNvPr id="8" name="Picture 7">
+            <a:extLst>
+              <a:ext uri="{FF2B5EF4-FFF2-40B4-BE49-F238E27FC236}">
+                <a16:creationId xmlns:a16="http://schemas.microsoft.com/office/drawing/2014/main" id="{A3ECC48D-4958-4535-AF70-68996A75F3BA}"/>
+              </a:ext>
+            </a:extLst>
+          </p:cNvPr>
+          <p:cNvPicPr>
+            <a:picLocks noChangeAspect="1"/>
+          </p:cNvPicPr>
+          <p:nvPr/>
+        </p:nvPicPr>
+        <p:blipFill>
+          <a:blip r:embed="rId3">
+            <a:extLst>
+              <a:ext uri="{28A0092B-C50C-407E-A947-70E740481C1C}">
+                <a14:useLocalDpi xmlns:a14="http://schemas.microsoft.com/office/drawing/2010/main" val="0"/>
+              </a:ext>
+            </a:extLst>
+          </a:blip>
+          <a:stretch>
+            <a:fillRect/>
+          </a:stretch>
+        </p:blipFill>
+        <p:spPr>
+          <a:xfrm>
+            <a:off x="5940710" y="6324"/>
+            <a:ext cx="6967772" cy="3422676"/>
           </a:xfrm>
           <a:prstGeom prst="rect">
             <a:avLst/>
@@ -4476,10 +4511,10 @@
       </p:pic>
       <p:pic>
         <p:nvPicPr>
-          <p:cNvPr id="11" name="Picture 10">
-            <a:extLst>
-              <a:ext uri="{FF2B5EF4-FFF2-40B4-BE49-F238E27FC236}">
-                <a16:creationId xmlns:a16="http://schemas.microsoft.com/office/drawing/2014/main" id="{9307B0FF-8631-4F11-A193-5971C4E9C81A}"/>
+          <p:cNvPr id="12" name="Picture 11">
+            <a:extLst>
+              <a:ext uri="{FF2B5EF4-FFF2-40B4-BE49-F238E27FC236}">
+                <a16:creationId xmlns:a16="http://schemas.microsoft.com/office/drawing/2014/main" id="{3ED21197-9362-4612-9FD7-C6EC606863F0}"/>
               </a:ext>
             </a:extLst>
           </p:cNvPr>
@@ -4489,7 +4524,7 @@
           <p:nvPr/>
         </p:nvPicPr>
         <p:blipFill>
-          <a:blip r:embed="rId3">
+          <a:blip r:embed="rId4">
             <a:extLst>
               <a:ext uri="{28A0092B-C50C-407E-A947-70E740481C1C}">
                 <a14:useLocalDpi xmlns:a14="http://schemas.microsoft.com/office/drawing/2010/main" val="0"/>
@@ -4502,47 +4537,12 @@
         </p:blipFill>
         <p:spPr>
           <a:xfrm>
-            <a:off x="0" y="3247054"/>
-            <a:ext cx="4366540" cy="3610946"/>
+            <a:off x="5940710" y="3429000"/>
+            <a:ext cx="6677464" cy="3280072"/>
           </a:xfrm>
           <a:prstGeom prst="rect">
             <a:avLst/>
           </a:prstGeom>
-        </p:spPr>
-      </p:pic>
-      <p:pic>
-        <p:nvPicPr>
-          <p:cNvPr id="16" name="Content Placeholder 15">
-            <a:extLst>
-              <a:ext uri="{FF2B5EF4-FFF2-40B4-BE49-F238E27FC236}">
-                <a16:creationId xmlns:a16="http://schemas.microsoft.com/office/drawing/2014/main" id="{D41ACAEA-7514-47BA-BA30-ABD6657BE4AB}"/>
-              </a:ext>
-            </a:extLst>
-          </p:cNvPr>
-          <p:cNvPicPr>
-            <a:picLocks noGrp="1" noChangeAspect="1"/>
-          </p:cNvPicPr>
-          <p:nvPr>
-            <p:ph idx="1"/>
-          </p:nvPr>
-        </p:nvPicPr>
-        <p:blipFill>
-          <a:blip r:embed="rId4">
-            <a:extLst>
-              <a:ext uri="{28A0092B-C50C-407E-A947-70E740481C1C}">
-                <a14:useLocalDpi xmlns:a14="http://schemas.microsoft.com/office/drawing/2010/main" val="0"/>
-              </a:ext>
-            </a:extLst>
-          </a:blip>
-          <a:stretch>
-            <a:fillRect/>
-          </a:stretch>
-        </p:blipFill>
-        <p:spPr>
-          <a:xfrm>
-            <a:off x="0" y="-22802"/>
-            <a:ext cx="5167672" cy="3388908"/>
-          </a:xfrm>
         </p:spPr>
       </p:pic>
     </p:spTree>

</xml_diff>